<commit_message>
Update to the binary installation files
</commit_message>
<xml_diff>
--- a/mlapp/res/splash.pptx
+++ b/mlapp/res/splash.pptx
@@ -6,6 +6,7 @@
   </p:sldMasterIdLst>
   <p:sldIdLst>
     <p:sldId id="256" r:id="rId2"/>
+    <p:sldId id="257" r:id="rId3"/>
   </p:sldIdLst>
   <p:sldSz cx="12192000" cy="6858000"/>
   <p:notesSz cx="6858000" cy="9144000"/>
@@ -104,6 +105,11 @@
       </a:defRPr>
     </a:lvl9pPr>
   </p:defaultTextStyle>
+  <p:extLst>
+    <p:ext uri="{EFAFB233-063F-42B5-8137-9DF3F51BA10A}">
+      <p15:sldGuideLst xmlns:p15="http://schemas.microsoft.com/office/powerpoint/2012/main"/>
+    </p:ext>
+  </p:extLst>
 </p:presentation>
 </file>
 
@@ -256,7 +262,7 @@
           <a:p>
             <a:fld id="{B935AA16-5390-5C46-8419-B3DBF6B84DBE}" type="datetimeFigureOut">
               <a:rPr lang="en-US" smtClean="0"/>
-              <a:t>4/18/24</a:t>
+              <a:t>5/8/24</a:t>
             </a:fld>
             <a:endParaRPr lang="en-US"/>
           </a:p>
@@ -456,7 +462,7 @@
           <a:p>
             <a:fld id="{B935AA16-5390-5C46-8419-B3DBF6B84DBE}" type="datetimeFigureOut">
               <a:rPr lang="en-US" smtClean="0"/>
-              <a:t>4/18/24</a:t>
+              <a:t>5/8/24</a:t>
             </a:fld>
             <a:endParaRPr lang="en-US"/>
           </a:p>
@@ -666,7 +672,7 @@
           <a:p>
             <a:fld id="{B935AA16-5390-5C46-8419-B3DBF6B84DBE}" type="datetimeFigureOut">
               <a:rPr lang="en-US" smtClean="0"/>
-              <a:t>4/18/24</a:t>
+              <a:t>5/8/24</a:t>
             </a:fld>
             <a:endParaRPr lang="en-US"/>
           </a:p>
@@ -866,7 +872,7 @@
           <a:p>
             <a:fld id="{B935AA16-5390-5C46-8419-B3DBF6B84DBE}" type="datetimeFigureOut">
               <a:rPr lang="en-US" smtClean="0"/>
-              <a:t>4/18/24</a:t>
+              <a:t>5/8/24</a:t>
             </a:fld>
             <a:endParaRPr lang="en-US"/>
           </a:p>
@@ -1142,7 +1148,7 @@
           <a:p>
             <a:fld id="{B935AA16-5390-5C46-8419-B3DBF6B84DBE}" type="datetimeFigureOut">
               <a:rPr lang="en-US" smtClean="0"/>
-              <a:t>4/18/24</a:t>
+              <a:t>5/8/24</a:t>
             </a:fld>
             <a:endParaRPr lang="en-US"/>
           </a:p>
@@ -1410,7 +1416,7 @@
           <a:p>
             <a:fld id="{B935AA16-5390-5C46-8419-B3DBF6B84DBE}" type="datetimeFigureOut">
               <a:rPr lang="en-US" smtClean="0"/>
-              <a:t>4/18/24</a:t>
+              <a:t>5/8/24</a:t>
             </a:fld>
             <a:endParaRPr lang="en-US"/>
           </a:p>
@@ -1825,7 +1831,7 @@
           <a:p>
             <a:fld id="{B935AA16-5390-5C46-8419-B3DBF6B84DBE}" type="datetimeFigureOut">
               <a:rPr lang="en-US" smtClean="0"/>
-              <a:t>4/18/24</a:t>
+              <a:t>5/8/24</a:t>
             </a:fld>
             <a:endParaRPr lang="en-US"/>
           </a:p>
@@ -1967,7 +1973,7 @@
           <a:p>
             <a:fld id="{B935AA16-5390-5C46-8419-B3DBF6B84DBE}" type="datetimeFigureOut">
               <a:rPr lang="en-US" smtClean="0"/>
-              <a:t>4/18/24</a:t>
+              <a:t>5/8/24</a:t>
             </a:fld>
             <a:endParaRPr lang="en-US"/>
           </a:p>
@@ -2080,7 +2086,7 @@
           <a:p>
             <a:fld id="{B935AA16-5390-5C46-8419-B3DBF6B84DBE}" type="datetimeFigureOut">
               <a:rPr lang="en-US" smtClean="0"/>
-              <a:t>4/18/24</a:t>
+              <a:t>5/8/24</a:t>
             </a:fld>
             <a:endParaRPr lang="en-US"/>
           </a:p>
@@ -2393,7 +2399,7 @@
           <a:p>
             <a:fld id="{B935AA16-5390-5C46-8419-B3DBF6B84DBE}" type="datetimeFigureOut">
               <a:rPr lang="en-US" smtClean="0"/>
-              <a:t>4/18/24</a:t>
+              <a:t>5/8/24</a:t>
             </a:fld>
             <a:endParaRPr lang="en-US"/>
           </a:p>
@@ -2682,7 +2688,7 @@
           <a:p>
             <a:fld id="{B935AA16-5390-5C46-8419-B3DBF6B84DBE}" type="datetimeFigureOut">
               <a:rPr lang="en-US" smtClean="0"/>
-              <a:t>4/18/24</a:t>
+              <a:t>5/8/24</a:t>
             </a:fld>
             <a:endParaRPr lang="en-US"/>
           </a:p>
@@ -2925,7 +2931,7 @@
           <a:p>
             <a:fld id="{B935AA16-5390-5C46-8419-B3DBF6B84DBE}" type="datetimeFigureOut">
               <a:rPr lang="en-US" smtClean="0"/>
-              <a:t>4/18/24</a:t>
+              <a:t>5/8/24</a:t>
             </a:fld>
             <a:endParaRPr lang="en-US"/>
           </a:p>
@@ -3467,6 +3473,125 @@
     <p:extLst>
       <p:ext uri="{BB962C8B-B14F-4D97-AF65-F5344CB8AC3E}">
         <p14:creationId xmlns:p14="http://schemas.microsoft.com/office/powerpoint/2010/main" val="3118741908"/>
+      </p:ext>
+    </p:extLst>
+  </p:cSld>
+  <p:clrMapOvr>
+    <a:masterClrMapping/>
+  </p:clrMapOvr>
+</p:sld>
+</file>
+
+<file path=ppt/slides/slide2.xml><?xml version="1.0" encoding="utf-8"?>
+<p:sld xmlns:a="http://schemas.openxmlformats.org/drawingml/2006/main" xmlns:r="http://schemas.openxmlformats.org/officeDocument/2006/relationships" xmlns:p="http://schemas.openxmlformats.org/presentationml/2006/main">
+  <p:cSld>
+    <p:spTree>
+      <p:nvGrpSpPr>
+        <p:cNvPr id="1" name=""/>
+        <p:cNvGrpSpPr/>
+        <p:nvPr/>
+      </p:nvGrpSpPr>
+      <p:grpSpPr>
+        <a:xfrm>
+          <a:off x="0" y="0"/>
+          <a:ext cx="0" cy="0"/>
+          <a:chOff x="0" y="0"/>
+          <a:chExt cx="0" cy="0"/>
+        </a:xfrm>
+      </p:grpSpPr>
+      <p:sp>
+        <p:nvSpPr>
+          <p:cNvPr id="2" name="Rounded Rectangle 1">
+            <a:extLst>
+              <a:ext uri="{FF2B5EF4-FFF2-40B4-BE49-F238E27FC236}">
+                <a16:creationId xmlns:a16="http://schemas.microsoft.com/office/drawing/2014/main" id="{A2EC64F0-A941-9459-145B-79F84BCC36DE}"/>
+              </a:ext>
+            </a:extLst>
+          </p:cNvPr>
+          <p:cNvSpPr/>
+          <p:nvPr/>
+        </p:nvSpPr>
+        <p:spPr>
+          <a:xfrm>
+            <a:off x="2586681" y="1828800"/>
+            <a:ext cx="6886832" cy="3124200"/>
+          </a:xfrm>
+          <a:prstGeom prst="roundRect">
+            <a:avLst>
+              <a:gd name="adj" fmla="val 47284"/>
+            </a:avLst>
+          </a:prstGeom>
+          <a:solidFill>
+            <a:schemeClr val="accent2">
+              <a:lumMod val="20000"/>
+              <a:lumOff val="80000"/>
+            </a:schemeClr>
+          </a:solidFill>
+          <a:ln w="57150">
+            <a:solidFill>
+              <a:schemeClr val="tx1"/>
+            </a:solidFill>
+          </a:ln>
+        </p:spPr>
+        <p:style>
+          <a:lnRef idx="2">
+            <a:schemeClr val="accent1">
+              <a:shade val="15000"/>
+            </a:schemeClr>
+          </a:lnRef>
+          <a:fillRef idx="1">
+            <a:schemeClr val="accent1"/>
+          </a:fillRef>
+          <a:effectRef idx="0">
+            <a:schemeClr val="accent1"/>
+          </a:effectRef>
+          <a:fontRef idx="minor">
+            <a:schemeClr val="lt1"/>
+          </a:fontRef>
+        </p:style>
+        <p:txBody>
+          <a:bodyPr rtlCol="0" anchor="ctr"/>
+          <a:lstStyle/>
+          <a:p>
+            <a:pPr algn="ctr"/>
+            <a:endParaRPr lang="en-US"/>
+          </a:p>
+        </p:txBody>
+      </p:sp>
+      <p:pic>
+        <p:nvPicPr>
+          <p:cNvPr id="3" name="Picture 2" descr="A logo with text and circles&#10;&#10;Description automatically generated with medium confidence">
+            <a:extLst>
+              <a:ext uri="{FF2B5EF4-FFF2-40B4-BE49-F238E27FC236}">
+                <a16:creationId xmlns:a16="http://schemas.microsoft.com/office/drawing/2014/main" id="{1626E454-37FB-0D76-F320-1C3918669377}"/>
+              </a:ext>
+            </a:extLst>
+          </p:cNvPr>
+          <p:cNvPicPr>
+            <a:picLocks noChangeAspect="1"/>
+          </p:cNvPicPr>
+          <p:nvPr/>
+        </p:nvPicPr>
+        <p:blipFill>
+          <a:blip r:embed="rId2"/>
+          <a:stretch>
+            <a:fillRect/>
+          </a:stretch>
+        </p:blipFill>
+        <p:spPr>
+          <a:xfrm>
+            <a:off x="2927350" y="1880286"/>
+            <a:ext cx="6337300" cy="3048000"/>
+          </a:xfrm>
+          <a:prstGeom prst="rect">
+            <a:avLst/>
+          </a:prstGeom>
+        </p:spPr>
+      </p:pic>
+    </p:spTree>
+    <p:extLst>
+      <p:ext uri="{BB962C8B-B14F-4D97-AF65-F5344CB8AC3E}">
+        <p14:creationId xmlns:p14="http://schemas.microsoft.com/office/powerpoint/2010/main" val="2519462870"/>
       </p:ext>
     </p:extLst>
   </p:cSld>

</xml_diff>